<commit_message>
fix: add address feat needed
</commit_message>
<xml_diff>
--- a/Aula 6/ComandosDCL.pptx
+++ b/Aula 6/ComandosDCL.pptx
@@ -112,6 +112,11 @@
       </a:defRPr>
     </a:lvl9pPr>
   </p:defaultTextStyle>
+  <p:extLst>
+    <p:ext uri="{EFAFB233-063F-42B5-8137-9DF3F51BA10A}">
+      <p15:sldGuideLst xmlns:p15="http://schemas.microsoft.com/office/powerpoint/2012/main"/>
+    </p:ext>
+  </p:extLst>
 </p:presentation>
 </file>
 
@@ -262,7 +267,7 @@
           <a:p>
             <a:fld id="{1C45F205-BC06-4923-AE40-F9637F79EC90}" type="datetimeFigureOut">
               <a:rPr lang="pt-BR" smtClean="0"/>
-              <a:t>21/07/2025</a:t>
+              <a:t>05/10/2025</a:t>
             </a:fld>
             <a:endParaRPr lang="pt-BR"/>
           </a:p>
@@ -460,7 +465,7 @@
           <a:p>
             <a:fld id="{1C45F205-BC06-4923-AE40-F9637F79EC90}" type="datetimeFigureOut">
               <a:rPr lang="pt-BR" smtClean="0"/>
-              <a:t>21/07/2025</a:t>
+              <a:t>05/10/2025</a:t>
             </a:fld>
             <a:endParaRPr lang="pt-BR"/>
           </a:p>
@@ -668,7 +673,7 @@
           <a:p>
             <a:fld id="{1C45F205-BC06-4923-AE40-F9637F79EC90}" type="datetimeFigureOut">
               <a:rPr lang="pt-BR" smtClean="0"/>
-              <a:t>21/07/2025</a:t>
+              <a:t>05/10/2025</a:t>
             </a:fld>
             <a:endParaRPr lang="pt-BR"/>
           </a:p>
@@ -866,7 +871,7 @@
           <a:p>
             <a:fld id="{1C45F205-BC06-4923-AE40-F9637F79EC90}" type="datetimeFigureOut">
               <a:rPr lang="pt-BR" smtClean="0"/>
-              <a:t>21/07/2025</a:t>
+              <a:t>05/10/2025</a:t>
             </a:fld>
             <a:endParaRPr lang="pt-BR"/>
           </a:p>
@@ -1141,7 +1146,7 @@
           <a:p>
             <a:fld id="{1C45F205-BC06-4923-AE40-F9637F79EC90}" type="datetimeFigureOut">
               <a:rPr lang="pt-BR" smtClean="0"/>
-              <a:t>21/07/2025</a:t>
+              <a:t>05/10/2025</a:t>
             </a:fld>
             <a:endParaRPr lang="pt-BR"/>
           </a:p>
@@ -1406,7 +1411,7 @@
           <a:p>
             <a:fld id="{1C45F205-BC06-4923-AE40-F9637F79EC90}" type="datetimeFigureOut">
               <a:rPr lang="pt-BR" smtClean="0"/>
-              <a:t>21/07/2025</a:t>
+              <a:t>05/10/2025</a:t>
             </a:fld>
             <a:endParaRPr lang="pt-BR"/>
           </a:p>
@@ -1818,7 +1823,7 @@
           <a:p>
             <a:fld id="{1C45F205-BC06-4923-AE40-F9637F79EC90}" type="datetimeFigureOut">
               <a:rPr lang="pt-BR" smtClean="0"/>
-              <a:t>21/07/2025</a:t>
+              <a:t>05/10/2025</a:t>
             </a:fld>
             <a:endParaRPr lang="pt-BR"/>
           </a:p>
@@ -1959,7 +1964,7 @@
           <a:p>
             <a:fld id="{1C45F205-BC06-4923-AE40-F9637F79EC90}" type="datetimeFigureOut">
               <a:rPr lang="pt-BR" smtClean="0"/>
-              <a:t>21/07/2025</a:t>
+              <a:t>05/10/2025</a:t>
             </a:fld>
             <a:endParaRPr lang="pt-BR"/>
           </a:p>
@@ -2072,7 +2077,7 @@
           <a:p>
             <a:fld id="{1C45F205-BC06-4923-AE40-F9637F79EC90}" type="datetimeFigureOut">
               <a:rPr lang="pt-BR" smtClean="0"/>
-              <a:t>21/07/2025</a:t>
+              <a:t>05/10/2025</a:t>
             </a:fld>
             <a:endParaRPr lang="pt-BR"/>
           </a:p>
@@ -2383,7 +2388,7 @@
           <a:p>
             <a:fld id="{1C45F205-BC06-4923-AE40-F9637F79EC90}" type="datetimeFigureOut">
               <a:rPr lang="pt-BR" smtClean="0"/>
-              <a:t>21/07/2025</a:t>
+              <a:t>05/10/2025</a:t>
             </a:fld>
             <a:endParaRPr lang="pt-BR"/>
           </a:p>
@@ -2671,7 +2676,7 @@
           <a:p>
             <a:fld id="{1C45F205-BC06-4923-AE40-F9637F79EC90}" type="datetimeFigureOut">
               <a:rPr lang="pt-BR" smtClean="0"/>
-              <a:t>21/07/2025</a:t>
+              <a:t>05/10/2025</a:t>
             </a:fld>
             <a:endParaRPr lang="pt-BR"/>
           </a:p>
@@ -2912,7 +2917,7 @@
           <a:p>
             <a:fld id="{1C45F205-BC06-4923-AE40-F9637F79EC90}" type="datetimeFigureOut">
               <a:rPr lang="pt-BR" smtClean="0"/>
-              <a:t>21/07/2025</a:t>
+              <a:t>05/10/2025</a:t>
             </a:fld>
             <a:endParaRPr lang="pt-BR"/>
           </a:p>
@@ -4354,7 +4359,7 @@
         <p:spPr>
           <a:xfrm>
             <a:off x="756138" y="1086650"/>
-            <a:ext cx="10955215" cy="2554545"/>
+            <a:ext cx="10955215" cy="2862322"/>
           </a:xfrm>
           <a:prstGeom prst="rect">
             <a:avLst/>
@@ -4465,11 +4470,103 @@
             </a:r>
             <a:r>
               <a:rPr lang="en-US" sz="2000" dirty="0"/>
-              <a:t>.</a:t>
-            </a:r>
-          </a:p>
-          <a:p>
-            <a:endParaRPr lang="en-US" sz="2000" u="sng" dirty="0"/>
+              <a:t>. De modo </a:t>
+            </a:r>
+            <a:r>
+              <a:rPr lang="en-US" sz="2000" dirty="0" err="1"/>
+              <a:t>geral</a:t>
+            </a:r>
+            <a:r>
+              <a:rPr lang="en-US" sz="2000" dirty="0"/>
+              <a:t>, </a:t>
+            </a:r>
+            <a:r>
+              <a:rPr lang="en-US" sz="2000" b="1" dirty="0"/>
+              <a:t>é </a:t>
+            </a:r>
+            <a:r>
+              <a:rPr lang="en-US" sz="2000" b="1" dirty="0" err="1"/>
+              <a:t>necessário</a:t>
+            </a:r>
+            <a:r>
+              <a:rPr lang="en-US" sz="2000" dirty="0"/>
+              <a:t> </a:t>
+            </a:r>
+            <a:r>
+              <a:rPr lang="en-US" sz="2000" dirty="0" err="1"/>
+              <a:t>que</a:t>
+            </a:r>
+            <a:r>
+              <a:rPr lang="en-US" sz="2000" dirty="0"/>
+              <a:t> </a:t>
+            </a:r>
+            <a:r>
+              <a:rPr lang="en-US" sz="2000" dirty="0" err="1"/>
+              <a:t>informemos</a:t>
+            </a:r>
+            <a:r>
+              <a:rPr lang="en-US" sz="2000" dirty="0"/>
+              <a:t> qual o </a:t>
+            </a:r>
+            <a:r>
+              <a:rPr lang="en-US" sz="2000" dirty="0" err="1"/>
+              <a:t>endereço</a:t>
+            </a:r>
+            <a:r>
+              <a:rPr lang="en-US" sz="2000" dirty="0"/>
+              <a:t> IP </a:t>
+            </a:r>
+            <a:r>
+              <a:rPr lang="en-US" sz="2000" dirty="0" err="1"/>
+              <a:t>poderá</a:t>
+            </a:r>
+            <a:r>
+              <a:rPr lang="en-US" sz="2000" dirty="0"/>
+              <a:t> </a:t>
+            </a:r>
+            <a:r>
+              <a:rPr lang="en-US" sz="2000" dirty="0" err="1"/>
+              <a:t>acessar</a:t>
+            </a:r>
+            <a:r>
+              <a:rPr lang="en-US" sz="2000" dirty="0"/>
+              <a:t> (‘@’%’, ‘@’localhost’ </a:t>
+            </a:r>
+            <a:r>
+              <a:rPr lang="en-US" sz="2000" dirty="0" err="1"/>
+              <a:t>ou</a:t>
+            </a:r>
+            <a:r>
+              <a:rPr lang="en-US" sz="2000" dirty="0"/>
+              <a:t> ‘@’</a:t>
+            </a:r>
+            <a:r>
+              <a:rPr lang="en-US" sz="2000" dirty="0" err="1"/>
+              <a:t>EndereçoIP</a:t>
+            </a:r>
+            <a:r>
+              <a:rPr lang="en-US" sz="2000" dirty="0"/>
+              <a:t>’ </a:t>
+            </a:r>
+            <a:r>
+              <a:rPr lang="en-US" sz="2000" dirty="0" err="1"/>
+              <a:t>após</a:t>
+            </a:r>
+            <a:r>
+              <a:rPr lang="en-US" sz="2000" dirty="0"/>
+              <a:t> o </a:t>
+            </a:r>
+            <a:r>
+              <a:rPr lang="en-US" sz="2000" dirty="0" err="1"/>
+              <a:t>nome</a:t>
+            </a:r>
+            <a:r>
+              <a:rPr lang="en-US" sz="2000" dirty="0"/>
+              <a:t>).</a:t>
+            </a:r>
+          </a:p>
+          <a:p>
+            <a:endParaRPr lang="en-US" sz="2000" dirty="0"/>
           </a:p>
           <a:p>
             <a:r>
@@ -5102,7 +5199,7 @@
         <p:spPr>
           <a:xfrm>
             <a:off x="5864469" y="1573822"/>
-            <a:ext cx="5460023" cy="4524315"/>
+            <a:ext cx="5460023" cy="4154984"/>
           </a:xfrm>
           <a:prstGeom prst="rect">
             <a:avLst/>
@@ -5232,23 +5329,7 @@
             </a:r>
             <a:r>
               <a:rPr lang="en-US" sz="2400" dirty="0"/>
-              <a:t> INSERT, DELETE e DROP </a:t>
-            </a:r>
-            <a:r>
-              <a:rPr lang="en-US" sz="2400" dirty="0" err="1"/>
-              <a:t>na</a:t>
-            </a:r>
-            <a:r>
-              <a:rPr lang="en-US" sz="2400" dirty="0"/>
-              <a:t> </a:t>
-            </a:r>
-            <a:r>
-              <a:rPr lang="en-US" sz="2400" dirty="0" err="1"/>
-              <a:t>tabela</a:t>
-            </a:r>
-            <a:r>
-              <a:rPr lang="en-US" sz="2400" dirty="0"/>
-              <a:t> Musica;</a:t>
+              <a:t> INSERT, DELETE;</a:t>
             </a:r>
           </a:p>
           <a:p>
@@ -5364,23 +5445,7 @@
             </a:r>
             <a:r>
               <a:rPr lang="en-US" sz="2400" dirty="0"/>
-              <a:t> </a:t>
-            </a:r>
-            <a:r>
-              <a:rPr lang="en-US" sz="2400" dirty="0" err="1"/>
-              <a:t>na</a:t>
-            </a:r>
-            <a:r>
-              <a:rPr lang="en-US" sz="2400" dirty="0"/>
-              <a:t> </a:t>
-            </a:r>
-            <a:r>
-              <a:rPr lang="en-US" sz="2400" dirty="0" err="1"/>
-              <a:t>tabela</a:t>
-            </a:r>
-            <a:r>
-              <a:rPr lang="en-US" sz="2400" dirty="0"/>
-              <a:t> Musica;</a:t>
+              <a:t>;</a:t>
             </a:r>
           </a:p>
           <a:p>

</xml_diff>

<commit_message>
fix: add necessary adress to users in `Aula 6`
</commit_message>
<xml_diff>
--- a/Aula 6/ComandosDCL.pptx
+++ b/Aula 6/ComandosDCL.pptx
@@ -267,7 +267,7 @@
           <a:p>
             <a:fld id="{1C45F205-BC06-4923-AE40-F9637F79EC90}" type="datetimeFigureOut">
               <a:rPr lang="pt-BR" smtClean="0"/>
-              <a:t>05/10/2025</a:t>
+              <a:t>25/01/2026</a:t>
             </a:fld>
             <a:endParaRPr lang="pt-BR"/>
           </a:p>
@@ -465,7 +465,7 @@
           <a:p>
             <a:fld id="{1C45F205-BC06-4923-AE40-F9637F79EC90}" type="datetimeFigureOut">
               <a:rPr lang="pt-BR" smtClean="0"/>
-              <a:t>05/10/2025</a:t>
+              <a:t>25/01/2026</a:t>
             </a:fld>
             <a:endParaRPr lang="pt-BR"/>
           </a:p>
@@ -673,7 +673,7 @@
           <a:p>
             <a:fld id="{1C45F205-BC06-4923-AE40-F9637F79EC90}" type="datetimeFigureOut">
               <a:rPr lang="pt-BR" smtClean="0"/>
-              <a:t>05/10/2025</a:t>
+              <a:t>25/01/2026</a:t>
             </a:fld>
             <a:endParaRPr lang="pt-BR"/>
           </a:p>
@@ -871,7 +871,7 @@
           <a:p>
             <a:fld id="{1C45F205-BC06-4923-AE40-F9637F79EC90}" type="datetimeFigureOut">
               <a:rPr lang="pt-BR" smtClean="0"/>
-              <a:t>05/10/2025</a:t>
+              <a:t>25/01/2026</a:t>
             </a:fld>
             <a:endParaRPr lang="pt-BR"/>
           </a:p>
@@ -1146,7 +1146,7 @@
           <a:p>
             <a:fld id="{1C45F205-BC06-4923-AE40-F9637F79EC90}" type="datetimeFigureOut">
               <a:rPr lang="pt-BR" smtClean="0"/>
-              <a:t>05/10/2025</a:t>
+              <a:t>25/01/2026</a:t>
             </a:fld>
             <a:endParaRPr lang="pt-BR"/>
           </a:p>
@@ -1411,7 +1411,7 @@
           <a:p>
             <a:fld id="{1C45F205-BC06-4923-AE40-F9637F79EC90}" type="datetimeFigureOut">
               <a:rPr lang="pt-BR" smtClean="0"/>
-              <a:t>05/10/2025</a:t>
+              <a:t>25/01/2026</a:t>
             </a:fld>
             <a:endParaRPr lang="pt-BR"/>
           </a:p>
@@ -1823,7 +1823,7 @@
           <a:p>
             <a:fld id="{1C45F205-BC06-4923-AE40-F9637F79EC90}" type="datetimeFigureOut">
               <a:rPr lang="pt-BR" smtClean="0"/>
-              <a:t>05/10/2025</a:t>
+              <a:t>25/01/2026</a:t>
             </a:fld>
             <a:endParaRPr lang="pt-BR"/>
           </a:p>
@@ -1964,7 +1964,7 @@
           <a:p>
             <a:fld id="{1C45F205-BC06-4923-AE40-F9637F79EC90}" type="datetimeFigureOut">
               <a:rPr lang="pt-BR" smtClean="0"/>
-              <a:t>05/10/2025</a:t>
+              <a:t>25/01/2026</a:t>
             </a:fld>
             <a:endParaRPr lang="pt-BR"/>
           </a:p>
@@ -2077,7 +2077,7 @@
           <a:p>
             <a:fld id="{1C45F205-BC06-4923-AE40-F9637F79EC90}" type="datetimeFigureOut">
               <a:rPr lang="pt-BR" smtClean="0"/>
-              <a:t>05/10/2025</a:t>
+              <a:t>25/01/2026</a:t>
             </a:fld>
             <a:endParaRPr lang="pt-BR"/>
           </a:p>
@@ -2388,7 +2388,7 @@
           <a:p>
             <a:fld id="{1C45F205-BC06-4923-AE40-F9637F79EC90}" type="datetimeFigureOut">
               <a:rPr lang="pt-BR" smtClean="0"/>
-              <a:t>05/10/2025</a:t>
+              <a:t>25/01/2026</a:t>
             </a:fld>
             <a:endParaRPr lang="pt-BR"/>
           </a:p>
@@ -2676,7 +2676,7 @@
           <a:p>
             <a:fld id="{1C45F205-BC06-4923-AE40-F9637F79EC90}" type="datetimeFigureOut">
               <a:rPr lang="pt-BR" smtClean="0"/>
-              <a:t>05/10/2025</a:t>
+              <a:t>25/01/2026</a:t>
             </a:fld>
             <a:endParaRPr lang="pt-BR"/>
           </a:p>
@@ -2917,7 +2917,7 @@
           <a:p>
             <a:fld id="{1C45F205-BC06-4923-AE40-F9637F79EC90}" type="datetimeFigureOut">
               <a:rPr lang="pt-BR" smtClean="0"/>
-              <a:t>05/10/2025</a:t>
+              <a:t>25/01/2026</a:t>
             </a:fld>
             <a:endParaRPr lang="pt-BR"/>
           </a:p>
@@ -4372,6 +4372,7 @@
           </a:bodyPr>
           <a:lstStyle/>
           <a:p>
+            <a:pPr algn="ctr"/>
             <a:r>
               <a:rPr lang="en-US" sz="2000" dirty="0"/>
               <a:t>Concede </a:t>
@@ -4406,7 +4407,7 @@
             </a:r>
             <a:r>
               <a:rPr lang="en-US" sz="2000" dirty="0"/>
-              <a:t>, é claro que é </a:t>
+              <a:t>, é </a:t>
             </a:r>
             <a:r>
               <a:rPr lang="en-US" sz="2000" dirty="0" err="1"/>
@@ -4636,10 +4637,10 @@
       </p:sp>
       <p:pic>
         <p:nvPicPr>
-          <p:cNvPr id="6" name="Imagem 5">
-            <a:extLst>
-              <a:ext uri="{FF2B5EF4-FFF2-40B4-BE49-F238E27FC236}">
-                <a16:creationId xmlns:a16="http://schemas.microsoft.com/office/drawing/2014/main" id="{206D6FEA-1122-81F7-005F-D92F800A8587}"/>
+          <p:cNvPr id="7" name="Imagem 6" descr="Texto&#10;&#10;O conteúdo gerado por IA pode estar incorreto.">
+            <a:extLst>
+              <a:ext uri="{FF2B5EF4-FFF2-40B4-BE49-F238E27FC236}">
+                <a16:creationId xmlns:a16="http://schemas.microsoft.com/office/drawing/2014/main" id="{F1FAE06D-BC0D-B9AE-5994-259E06641914}"/>
               </a:ext>
             </a:extLst>
           </p:cNvPr>
@@ -4656,8 +4657,8 @@
         </p:blipFill>
         <p:spPr>
           <a:xfrm>
-            <a:off x="2495047" y="4044517"/>
-            <a:ext cx="7201905" cy="2410161"/>
+            <a:off x="2399397" y="4160300"/>
+            <a:ext cx="7668695" cy="2486372"/>
           </a:xfrm>
           <a:prstGeom prst="rect">
             <a:avLst/>
@@ -4804,6 +4805,7 @@
           </a:bodyPr>
           <a:lstStyle/>
           <a:p>
+            <a:pPr algn="ctr"/>
             <a:r>
               <a:rPr lang="en-US" sz="2000" dirty="0" err="1"/>
               <a:t>Revoga</a:t>
@@ -5176,8 +5178,8 @@
         </p:blipFill>
         <p:spPr>
           <a:xfrm>
-            <a:off x="867508" y="1826406"/>
-            <a:ext cx="4005127" cy="3383642"/>
+            <a:off x="542078" y="1632043"/>
+            <a:ext cx="4780314" cy="4038541"/>
           </a:xfrm>
           <a:prstGeom prst="rect">
             <a:avLst/>
@@ -5198,8 +5200,8 @@
         </p:nvSpPr>
         <p:spPr>
           <a:xfrm>
-            <a:off x="5864469" y="1573822"/>
-            <a:ext cx="5460023" cy="4154984"/>
+            <a:off x="5864470" y="1943153"/>
+            <a:ext cx="5723793" cy="3416320"/>
           </a:xfrm>
           <a:prstGeom prst="rect">
             <a:avLst/>

</xml_diff>